<commit_message>
correction cxcle de vie
</commit_message>
<xml_diff>
--- a/Technique.pptx
+++ b/Technique.pptx
@@ -4043,11 +4043,7 @@
           <a:p>
             <a:r>
               <a:rPr lang="fr-CH" dirty="0" smtClean="0"/>
-              <a:t>Langage </a:t>
-            </a:r>
-            <a:r>
-              <a:rPr lang="fr-CH" dirty="0" smtClean="0"/>
-              <a:t>de programmation Python</a:t>
+              <a:t>Langage de programmation Python</a:t>
             </a:r>
           </a:p>
           <a:p>
@@ -4446,17 +4442,8 @@
           <a:p>
             <a:r>
               <a:rPr lang="fr-CH" dirty="0" smtClean="0"/>
-              <a:t>CSS3 pour la mise </a:t>
-            </a:r>
-            <a:r>
-              <a:rPr lang="fr-CH" dirty="0" smtClean="0"/>
-              <a:t>en forme (layout/design</a:t>
-            </a:r>
-            <a:r>
-              <a:rPr lang="fr-CH" dirty="0" smtClean="0"/>
-              <a:t>)</a:t>
-            </a:r>
-            <a:endParaRPr lang="fr-CH" dirty="0" smtClean="0"/>
+              <a:t>CSS3 pour la mise en forme (layout/design)</a:t>
+            </a:r>
           </a:p>
           <a:p>
             <a:r>
@@ -4930,35 +4917,20 @@
           <a:p>
             <a:r>
               <a:rPr lang="fr-FR" dirty="0" smtClean="0"/>
-              <a:t>MySQL </a:t>
-            </a:r>
-            <a:r>
-              <a:rPr lang="fr-FR" dirty="0" smtClean="0"/>
-              <a:t>référence dans l’industrie très utilisé comme base de donnée open source</a:t>
-            </a:r>
-            <a:endParaRPr lang="fr-FR" dirty="0" smtClean="0"/>
+              <a:t>MySQL référence dans l’industrie très utilisé comme base de donnée open source</a:t>
+            </a:r>
           </a:p>
           <a:p>
             <a:r>
               <a:rPr lang="fr-FR" dirty="0" smtClean="0"/>
               <a:t>Légère à mettre en place mais avec fonctionnalité assez pointue</a:t>
             </a:r>
-            <a:endParaRPr lang="fr-FR" dirty="0" smtClean="0"/>
           </a:p>
           <a:p>
             <a:r>
               <a:rPr lang="fr-FR" dirty="0" smtClean="0"/>
-              <a:t>Bases de </a:t>
-            </a:r>
-            <a:r>
-              <a:rPr lang="fr-FR" dirty="0" smtClean="0"/>
-              <a:t>données unique pour toutes les pizzérias</a:t>
-            </a:r>
-            <a:r>
-              <a:rPr lang="fr-FR" dirty="0" smtClean="0"/>
-              <a:t> à partir d’une application centrale</a:t>
-            </a:r>
-            <a:endParaRPr lang="fr-FR" dirty="0" smtClean="0"/>
+              <a:t>Bases de données unique pour toutes les pizzérias à partir d’une application centrale</a:t>
+            </a:r>
           </a:p>
           <a:p>
             <a:r>
@@ -4971,7 +4943,6 @@
               <a:rPr lang="fr-FR" dirty="0" smtClean="0"/>
               <a:t>On aura donc une seule application pour toutes les pizzerias </a:t>
             </a:r>
-            <a:endParaRPr lang="fr-FR" dirty="0" smtClean="0"/>
           </a:p>
         </p:txBody>
       </p:sp>
@@ -5449,11 +5420,7 @@
           <a:p>
             <a:r>
               <a:rPr lang="fr-FR" dirty="0" smtClean="0"/>
-              <a:t>Les </a:t>
-            </a:r>
-            <a:r>
-              <a:rPr lang="fr-FR" dirty="0" smtClean="0"/>
-              <a:t>livreurs</a:t>
+              <a:t>Les livreurs</a:t>
             </a:r>
           </a:p>
           <a:p>
@@ -6531,11 +6498,7 @@
           <a:p>
             <a:r>
               <a:rPr lang="fr-FR" dirty="0" smtClean="0"/>
-              <a:t>Gestion </a:t>
-            </a:r>
-            <a:r>
-              <a:rPr lang="fr-FR" dirty="0" smtClean="0"/>
-              <a:t>des stocks</a:t>
+              <a:t>Gestion des stocks</a:t>
             </a:r>
           </a:p>
           <a:p>

</xml_diff>